<commit_message>
correction numero 2 diapo
</commit_message>
<xml_diff>
--- a/ressources/presentation/PresentationPER_Desbarats_V3.pptx
+++ b/ressources/presentation/PresentationPER_Desbarats_V3.pptx
@@ -791,8 +791,8 @@
           <c:showBubbleSize val="0"/>
         </c:dLbls>
         <c:smooth val="0"/>
-        <c:axId val="-812629888"/>
-        <c:axId val="-812637504"/>
+        <c:axId val="1709276736"/>
+        <c:axId val="1709270208"/>
         <c:extLst>
           <c:ext xmlns:c15="http://schemas.microsoft.com/office/drawing/2012/chart" uri="{02D57815-91ED-43cb-92C2-25804820EDAC}">
             <c15:filteredLineSeries>
@@ -991,7 +991,7 @@
         </c:extLst>
       </c:lineChart>
       <c:catAx>
-        <c:axId val="-812629888"/>
+        <c:axId val="1709276736"/>
         <c:scaling>
           <c:orientation val="minMax"/>
         </c:scaling>
@@ -1034,7 +1034,7 @@
             <a:endParaRPr lang="fr-FR"/>
           </a:p>
         </c:txPr>
-        <c:crossAx val="-812637504"/>
+        <c:crossAx val="1709270208"/>
         <c:crosses val="autoZero"/>
         <c:auto val="1"/>
         <c:lblAlgn val="ctr"/>
@@ -1042,7 +1042,7 @@
         <c:noMultiLvlLbl val="0"/>
       </c:catAx>
       <c:valAx>
-        <c:axId val="-812637504"/>
+        <c:axId val="1709270208"/>
         <c:scaling>
           <c:orientation val="minMax"/>
           <c:max val="100"/>
@@ -1094,7 +1094,7 @@
             <a:endParaRPr lang="fr-FR"/>
           </a:p>
         </c:txPr>
-        <c:crossAx val="-812629888"/>
+        <c:crossAx val="1709276736"/>
         <c:crosses val="autoZero"/>
         <c:crossBetween val="between"/>
       </c:valAx>
@@ -10878,19 +10878,7 @@
             <a:pPr lvl="1"/>
             <a:r>
               <a:rPr lang="fr-FR" sz="2400" dirty="0" smtClean="0"/>
-              <a:t>Scan the area in </a:t>
-            </a:r>
-            <a:r>
-              <a:rPr lang="fr-FR" sz="2400" dirty="0" smtClean="0"/>
-              <a:t>40</a:t>
-            </a:r>
-            <a:r>
-              <a:rPr lang="fr-FR" sz="2400" dirty="0" smtClean="0"/>
-              <a:t> </a:t>
-            </a:r>
-            <a:r>
-              <a:rPr lang="fr-FR" sz="2400" dirty="0" smtClean="0"/>
-              <a:t>min</a:t>
+              <a:t>Scan the area in 40 min</a:t>
             </a:r>
           </a:p>
           <a:p>
@@ -14705,7 +14693,7 @@
       </p:sp>
       <p:pic>
         <p:nvPicPr>
-          <p:cNvPr id="12" name="Image 11"/>
+          <p:cNvPr id="5" name="Image 4"/>
           <p:cNvPicPr>
             <a:picLocks noChangeAspect="1"/>
           </p:cNvPicPr>
@@ -14719,8 +14707,8 @@
         </p:blipFill>
         <p:spPr>
           <a:xfrm>
-            <a:off x="1035885" y="2049171"/>
-            <a:ext cx="3787697" cy="3946463"/>
+            <a:off x="4938962" y="2318393"/>
+            <a:ext cx="4171502" cy="3408017"/>
           </a:xfrm>
           <a:prstGeom prst="rect">
             <a:avLst/>
@@ -14729,7 +14717,7 @@
       </p:pic>
       <p:pic>
         <p:nvPicPr>
-          <p:cNvPr id="5" name="Image 4"/>
+          <p:cNvPr id="3" name="Image 2"/>
           <p:cNvPicPr>
             <a:picLocks noChangeAspect="1"/>
           </p:cNvPicPr>
@@ -14743,8 +14731,8 @@
         </p:blipFill>
         <p:spPr>
           <a:xfrm>
-            <a:off x="4938962" y="2318393"/>
-            <a:ext cx="4171502" cy="3408017"/>
+            <a:off x="335062" y="2012551"/>
+            <a:ext cx="4009380" cy="4201097"/>
           </a:xfrm>
           <a:prstGeom prst="rect">
             <a:avLst/>

</xml_diff>